<commit_message>
Update font size graph
</commit_message>
<xml_diff>
--- a/Classification of the gender of Big five survey.pptx
+++ b/Classification of the gender of Big five survey.pptx
@@ -124,6 +124,11 @@
       </a:defRPr>
     </a:lvl9pPr>
   </p:defaultTextStyle>
+  <p:extLst>
+    <p:ext uri="{EFAFB233-063F-42B5-8137-9DF3F51BA10A}">
+      <p15:sldGuideLst xmlns:p15="http://schemas.microsoft.com/office/powerpoint/2012/main"/>
+    </p:ext>
+  </p:extLst>
 </p:presentation>
 </file>
 
@@ -4859,7 +4864,7 @@
         </p:spPr>
         <p:txBody>
           <a:bodyPr vert="horz" lIns="91440" tIns="45720" rIns="91440" bIns="45720" rtlCol="0" anchor="b">
-            <a:normAutofit/>
+            <a:normAutofit fontScale="85000" lnSpcReduction="20000"/>
           </a:bodyPr>
           <a:lstStyle>
             <a:lvl1pPr algn="l" defTabSz="914400" rtl="0" eaLnBrk="1" latinLnBrk="0" hangingPunct="1">
@@ -4883,7 +4888,13 @@
           <a:p>
             <a:r>
               <a:rPr lang="en-US" dirty="0"/>
-              <a:t>Results – </a:t>
+              <a:t>Results</a:t>
+            </a:r>
+          </a:p>
+          <a:p>
+            <a:r>
+              <a:rPr lang="en-US" dirty="0"/>
+              <a:t> – </a:t>
             </a:r>
             <a:r>
               <a:rPr lang="en-US" sz="2800" dirty="0"/>
@@ -5227,6 +5238,66 @@
           </a:p>
         </p:txBody>
       </p:sp>
+      <p:pic>
+        <p:nvPicPr>
+          <p:cNvPr id="3" name="Picture 2">
+            <a:extLst>
+              <a:ext uri="{FF2B5EF4-FFF2-40B4-BE49-F238E27FC236}">
+                <a16:creationId xmlns:a16="http://schemas.microsoft.com/office/drawing/2014/main" id="{59223065-063F-4EEA-AAF6-CB3DA3EE6158}"/>
+              </a:ext>
+            </a:extLst>
+          </p:cNvPr>
+          <p:cNvPicPr>
+            <a:picLocks noChangeAspect="1"/>
+          </p:cNvPicPr>
+          <p:nvPr/>
+        </p:nvPicPr>
+        <p:blipFill>
+          <a:blip r:embed="rId2"/>
+          <a:stretch>
+            <a:fillRect/>
+          </a:stretch>
+        </p:blipFill>
+        <p:spPr>
+          <a:xfrm>
+            <a:off x="3398599" y="268712"/>
+            <a:ext cx="7537143" cy="3257081"/>
+          </a:xfrm>
+          <a:prstGeom prst="rect">
+            <a:avLst/>
+          </a:prstGeom>
+        </p:spPr>
+      </p:pic>
+      <p:pic>
+        <p:nvPicPr>
+          <p:cNvPr id="6" name="Picture 5">
+            <a:extLst>
+              <a:ext uri="{FF2B5EF4-FFF2-40B4-BE49-F238E27FC236}">
+                <a16:creationId xmlns:a16="http://schemas.microsoft.com/office/drawing/2014/main" id="{8B052FA8-71B5-4B89-A6AB-2A9FF34C7E41}"/>
+              </a:ext>
+            </a:extLst>
+          </p:cNvPr>
+          <p:cNvPicPr>
+            <a:picLocks noChangeAspect="1"/>
+          </p:cNvPicPr>
+          <p:nvPr/>
+        </p:nvPicPr>
+        <p:blipFill>
+          <a:blip r:embed="rId3"/>
+          <a:stretch>
+            <a:fillRect/>
+          </a:stretch>
+        </p:blipFill>
+        <p:spPr>
+          <a:xfrm>
+            <a:off x="3398599" y="3428999"/>
+            <a:ext cx="7662979" cy="3309151"/>
+          </a:xfrm>
+          <a:prstGeom prst="rect">
+            <a:avLst/>
+          </a:prstGeom>
+        </p:spPr>
+      </p:pic>
     </p:spTree>
     <p:extLst>
       <p:ext uri="{BB962C8B-B14F-4D97-AF65-F5344CB8AC3E}">
@@ -5257,6 +5328,66 @@
           <a:chExt cx="0" cy="0"/>
         </a:xfrm>
       </p:grpSpPr>
+      <p:pic>
+        <p:nvPicPr>
+          <p:cNvPr id="11" name="Picture 10">
+            <a:extLst>
+              <a:ext uri="{FF2B5EF4-FFF2-40B4-BE49-F238E27FC236}">
+                <a16:creationId xmlns:a16="http://schemas.microsoft.com/office/drawing/2014/main" id="{CBF6AD32-6904-4F97-8ADC-5B4B1B3ED611}"/>
+              </a:ext>
+            </a:extLst>
+          </p:cNvPr>
+          <p:cNvPicPr>
+            <a:picLocks noChangeAspect="1"/>
+          </p:cNvPicPr>
+          <p:nvPr/>
+        </p:nvPicPr>
+        <p:blipFill>
+          <a:blip r:embed="rId2"/>
+          <a:stretch>
+            <a:fillRect/>
+          </a:stretch>
+        </p:blipFill>
+        <p:spPr>
+          <a:xfrm>
+            <a:off x="1101458" y="3815610"/>
+            <a:ext cx="7962643" cy="2977224"/>
+          </a:xfrm>
+          <a:prstGeom prst="rect">
+            <a:avLst/>
+          </a:prstGeom>
+        </p:spPr>
+      </p:pic>
+      <p:pic>
+        <p:nvPicPr>
+          <p:cNvPr id="4" name="Picture 3">
+            <a:extLst>
+              <a:ext uri="{FF2B5EF4-FFF2-40B4-BE49-F238E27FC236}">
+                <a16:creationId xmlns:a16="http://schemas.microsoft.com/office/drawing/2014/main" id="{D03FF4A7-E36F-4377-A1C8-A7D74E4FCD8F}"/>
+              </a:ext>
+            </a:extLst>
+          </p:cNvPr>
+          <p:cNvPicPr>
+            <a:picLocks noChangeAspect="1"/>
+          </p:cNvPicPr>
+          <p:nvPr/>
+        </p:nvPicPr>
+        <p:blipFill>
+          <a:blip r:embed="rId3"/>
+          <a:stretch>
+            <a:fillRect/>
+          </a:stretch>
+        </p:blipFill>
+        <p:spPr>
+          <a:xfrm>
+            <a:off x="913773" y="1031193"/>
+            <a:ext cx="8465307" cy="3272075"/>
+          </a:xfrm>
+          <a:prstGeom prst="rect">
+            <a:avLst/>
+          </a:prstGeom>
+        </p:spPr>
+      </p:pic>
       <p:sp>
         <p:nvSpPr>
           <p:cNvPr id="5" name="Title 1">
@@ -5318,36 +5449,6 @@
       </p:sp>
       <p:pic>
         <p:nvPicPr>
-          <p:cNvPr id="3" name="Picture 2">
-            <a:extLst>
-              <a:ext uri="{FF2B5EF4-FFF2-40B4-BE49-F238E27FC236}">
-                <a16:creationId xmlns:a16="http://schemas.microsoft.com/office/drawing/2014/main" id="{2E5EDA04-AA53-4F9E-8761-0CF16E6664B8}"/>
-              </a:ext>
-            </a:extLst>
-          </p:cNvPr>
-          <p:cNvPicPr>
-            <a:picLocks noChangeAspect="1"/>
-          </p:cNvPicPr>
-          <p:nvPr/>
-        </p:nvPicPr>
-        <p:blipFill>
-          <a:blip r:embed="rId2"/>
-          <a:stretch>
-            <a:fillRect/>
-          </a:stretch>
-        </p:blipFill>
-        <p:spPr>
-          <a:xfrm>
-            <a:off x="731952" y="1261583"/>
-            <a:ext cx="7701834" cy="2913002"/>
-          </a:xfrm>
-          <a:prstGeom prst="rect">
-            <a:avLst/>
-          </a:prstGeom>
-        </p:spPr>
-      </p:pic>
-      <p:pic>
-        <p:nvPicPr>
           <p:cNvPr id="7" name="Picture 6">
             <a:extLst>
               <a:ext uri="{FF2B5EF4-FFF2-40B4-BE49-F238E27FC236}">
@@ -5361,13 +5462,13 @@
           <p:nvPr/>
         </p:nvPicPr>
         <p:blipFill rotWithShape="1">
-          <a:blip r:embed="rId3"/>
+          <a:blip r:embed="rId4"/>
           <a:srcRect b="86279"/>
           <a:stretch/>
         </p:blipFill>
         <p:spPr>
           <a:xfrm>
-            <a:off x="731951" y="1182116"/>
+            <a:off x="776341" y="1119970"/>
             <a:ext cx="9243861" cy="242585"/>
           </a:xfrm>
           <a:prstGeom prst="rect">
@@ -5420,36 +5521,6 @@
           </a:p>
         </p:txBody>
       </p:sp>
-      <p:pic>
-        <p:nvPicPr>
-          <p:cNvPr id="6" name="Picture 5">
-            <a:extLst>
-              <a:ext uri="{FF2B5EF4-FFF2-40B4-BE49-F238E27FC236}">
-                <a16:creationId xmlns:a16="http://schemas.microsoft.com/office/drawing/2014/main" id="{477078A1-7CEE-4335-8569-CF8AE7E5307A}"/>
-              </a:ext>
-            </a:extLst>
-          </p:cNvPr>
-          <p:cNvPicPr>
-            <a:picLocks noChangeAspect="1"/>
-          </p:cNvPicPr>
-          <p:nvPr/>
-        </p:nvPicPr>
-        <p:blipFill>
-          <a:blip r:embed="rId4"/>
-          <a:stretch>
-            <a:fillRect/>
-          </a:stretch>
-        </p:blipFill>
-        <p:spPr>
-          <a:xfrm>
-            <a:off x="913774" y="4101483"/>
-            <a:ext cx="7520012" cy="2756517"/>
-          </a:xfrm>
-          <a:prstGeom prst="rect">
-            <a:avLst/>
-          </a:prstGeom>
-        </p:spPr>
-      </p:pic>
       <p:sp>
         <p:nvSpPr>
           <p:cNvPr id="9" name="Content Placeholder 2">
@@ -5466,7 +5537,7 @@
         </p:nvSpPr>
         <p:spPr>
           <a:xfrm>
-            <a:off x="913774" y="3949550"/>
+            <a:off x="913774" y="4064961"/>
             <a:ext cx="10364452" cy="609004"/>
           </a:xfrm>
           <a:prstGeom prst="rect">

</xml_diff>

<commit_message>
still need a review
</commit_message>
<xml_diff>
--- a/Classification of the gender of Big five survey.pptx
+++ b/Classification of the gender of Big five survey.pptx
@@ -4,6 +4,9 @@
   <p:sldMasterIdLst>
     <p:sldMasterId id="2147483721" r:id="rId1"/>
   </p:sldMasterIdLst>
+  <p:notesMasterIdLst>
+    <p:notesMasterId r:id="rId23"/>
+  </p:notesMasterIdLst>
   <p:sldIdLst>
     <p:sldId id="256" r:id="rId2"/>
     <p:sldId id="257" r:id="rId3"/>
@@ -132,6 +135,532 @@
 </p:presentation>
 </file>
 
+<file path=ppt/notesMasters/notesMaster1.xml><?xml version="1.0" encoding="utf-8"?>
+<p:notesMaster xmlns:a="http://schemas.openxmlformats.org/drawingml/2006/main" xmlns:r="http://schemas.openxmlformats.org/officeDocument/2006/relationships" xmlns:p="http://schemas.openxmlformats.org/presentationml/2006/main">
+  <p:cSld>
+    <p:bg>
+      <p:bgRef idx="1001">
+        <a:schemeClr val="bg1"/>
+      </p:bgRef>
+    </p:bg>
+    <p:spTree>
+      <p:nvGrpSpPr>
+        <p:cNvPr id="1" name=""/>
+        <p:cNvGrpSpPr/>
+        <p:nvPr/>
+      </p:nvGrpSpPr>
+      <p:grpSpPr>
+        <a:xfrm>
+          <a:off x="0" y="0"/>
+          <a:ext cx="0" cy="0"/>
+          <a:chOff x="0" y="0"/>
+          <a:chExt cx="0" cy="0"/>
+        </a:xfrm>
+      </p:grpSpPr>
+      <p:sp>
+        <p:nvSpPr>
+          <p:cNvPr id="2" name="Header Placeholder 1"/>
+          <p:cNvSpPr>
+            <a:spLocks noGrp="1"/>
+          </p:cNvSpPr>
+          <p:nvPr>
+            <p:ph type="hdr" sz="quarter"/>
+          </p:nvPr>
+        </p:nvSpPr>
+        <p:spPr>
+          <a:xfrm>
+            <a:off x="0" y="0"/>
+            <a:ext cx="2971800" cy="458788"/>
+          </a:xfrm>
+          <a:prstGeom prst="rect">
+            <a:avLst/>
+          </a:prstGeom>
+        </p:spPr>
+        <p:txBody>
+          <a:bodyPr vert="horz" lIns="91440" tIns="45720" rIns="91440" bIns="45720" rtlCol="0"/>
+          <a:lstStyle>
+            <a:lvl1pPr algn="l">
+              <a:defRPr sz="1200"/>
+            </a:lvl1pPr>
+          </a:lstStyle>
+          <a:p>
+            <a:endParaRPr lang="en-IL"/>
+          </a:p>
+        </p:txBody>
+      </p:sp>
+      <p:sp>
+        <p:nvSpPr>
+          <p:cNvPr id="3" name="Date Placeholder 2"/>
+          <p:cNvSpPr>
+            <a:spLocks noGrp="1"/>
+          </p:cNvSpPr>
+          <p:nvPr>
+            <p:ph type="dt" idx="1"/>
+          </p:nvPr>
+        </p:nvSpPr>
+        <p:spPr>
+          <a:xfrm>
+            <a:off x="3884613" y="0"/>
+            <a:ext cx="2971800" cy="458788"/>
+          </a:xfrm>
+          <a:prstGeom prst="rect">
+            <a:avLst/>
+          </a:prstGeom>
+        </p:spPr>
+        <p:txBody>
+          <a:bodyPr vert="horz" lIns="91440" tIns="45720" rIns="91440" bIns="45720" rtlCol="0"/>
+          <a:lstStyle>
+            <a:lvl1pPr algn="r">
+              <a:defRPr sz="1200"/>
+            </a:lvl1pPr>
+          </a:lstStyle>
+          <a:p>
+            <a:fld id="{6D07285C-B116-4714-81A5-04E13BBE6343}" type="datetimeFigureOut">
+              <a:rPr lang="en-IL" smtClean="0"/>
+              <a:t>03/03/2021</a:t>
+            </a:fld>
+            <a:endParaRPr lang="en-IL"/>
+          </a:p>
+        </p:txBody>
+      </p:sp>
+      <p:sp>
+        <p:nvSpPr>
+          <p:cNvPr id="4" name="Slide Image Placeholder 3"/>
+          <p:cNvSpPr>
+            <a:spLocks noGrp="1" noRot="1" noChangeAspect="1"/>
+          </p:cNvSpPr>
+          <p:nvPr>
+            <p:ph type="sldImg" idx="2"/>
+          </p:nvPr>
+        </p:nvSpPr>
+        <p:spPr>
+          <a:xfrm>
+            <a:off x="685800" y="1143000"/>
+            <a:ext cx="5486400" cy="3086100"/>
+          </a:xfrm>
+          <a:prstGeom prst="rect">
+            <a:avLst/>
+          </a:prstGeom>
+          <a:noFill/>
+          <a:ln w="12700">
+            <a:solidFill>
+              <a:prstClr val="black"/>
+            </a:solidFill>
+          </a:ln>
+        </p:spPr>
+        <p:txBody>
+          <a:bodyPr vert="horz" lIns="91440" tIns="45720" rIns="91440" bIns="45720" rtlCol="0" anchor="ctr"/>
+          <a:lstStyle/>
+          <a:p>
+            <a:endParaRPr lang="en-IL"/>
+          </a:p>
+        </p:txBody>
+      </p:sp>
+      <p:sp>
+        <p:nvSpPr>
+          <p:cNvPr id="5" name="Notes Placeholder 4"/>
+          <p:cNvSpPr>
+            <a:spLocks noGrp="1"/>
+          </p:cNvSpPr>
+          <p:nvPr>
+            <p:ph type="body" sz="quarter" idx="3"/>
+          </p:nvPr>
+        </p:nvSpPr>
+        <p:spPr>
+          <a:xfrm>
+            <a:off x="685800" y="4400550"/>
+            <a:ext cx="5486400" cy="3600450"/>
+          </a:xfrm>
+          <a:prstGeom prst="rect">
+            <a:avLst/>
+          </a:prstGeom>
+        </p:spPr>
+        <p:txBody>
+          <a:bodyPr vert="horz" lIns="91440" tIns="45720" rIns="91440" bIns="45720" rtlCol="0"/>
+          <a:lstStyle/>
+          <a:p>
+            <a:pPr lvl="0"/>
+            <a:r>
+              <a:rPr lang="en-US"/>
+              <a:t>Click to edit Master text styles</a:t>
+            </a:r>
+          </a:p>
+          <a:p>
+            <a:pPr lvl="1"/>
+            <a:r>
+              <a:rPr lang="en-US"/>
+              <a:t>Second level</a:t>
+            </a:r>
+          </a:p>
+          <a:p>
+            <a:pPr lvl="2"/>
+            <a:r>
+              <a:rPr lang="en-US"/>
+              <a:t>Third level</a:t>
+            </a:r>
+          </a:p>
+          <a:p>
+            <a:pPr lvl="3"/>
+            <a:r>
+              <a:rPr lang="en-US"/>
+              <a:t>Fourth level</a:t>
+            </a:r>
+          </a:p>
+          <a:p>
+            <a:pPr lvl="4"/>
+            <a:r>
+              <a:rPr lang="en-US"/>
+              <a:t>Fifth level</a:t>
+            </a:r>
+            <a:endParaRPr lang="en-IL"/>
+          </a:p>
+        </p:txBody>
+      </p:sp>
+      <p:sp>
+        <p:nvSpPr>
+          <p:cNvPr id="6" name="Footer Placeholder 5"/>
+          <p:cNvSpPr>
+            <a:spLocks noGrp="1"/>
+          </p:cNvSpPr>
+          <p:nvPr>
+            <p:ph type="ftr" sz="quarter" idx="4"/>
+          </p:nvPr>
+        </p:nvSpPr>
+        <p:spPr>
+          <a:xfrm>
+            <a:off x="0" y="8685213"/>
+            <a:ext cx="2971800" cy="458787"/>
+          </a:xfrm>
+          <a:prstGeom prst="rect">
+            <a:avLst/>
+          </a:prstGeom>
+        </p:spPr>
+        <p:txBody>
+          <a:bodyPr vert="horz" lIns="91440" tIns="45720" rIns="91440" bIns="45720" rtlCol="0" anchor="b"/>
+          <a:lstStyle>
+            <a:lvl1pPr algn="l">
+              <a:defRPr sz="1200"/>
+            </a:lvl1pPr>
+          </a:lstStyle>
+          <a:p>
+            <a:endParaRPr lang="en-IL"/>
+          </a:p>
+        </p:txBody>
+      </p:sp>
+      <p:sp>
+        <p:nvSpPr>
+          <p:cNvPr id="7" name="Slide Number Placeholder 6"/>
+          <p:cNvSpPr>
+            <a:spLocks noGrp="1"/>
+          </p:cNvSpPr>
+          <p:nvPr>
+            <p:ph type="sldNum" sz="quarter" idx="5"/>
+          </p:nvPr>
+        </p:nvSpPr>
+        <p:spPr>
+          <a:xfrm>
+            <a:off x="3884613" y="8685213"/>
+            <a:ext cx="2971800" cy="458787"/>
+          </a:xfrm>
+          <a:prstGeom prst="rect">
+            <a:avLst/>
+          </a:prstGeom>
+        </p:spPr>
+        <p:txBody>
+          <a:bodyPr vert="horz" lIns="91440" tIns="45720" rIns="91440" bIns="45720" rtlCol="0" anchor="b"/>
+          <a:lstStyle>
+            <a:lvl1pPr algn="r">
+              <a:defRPr sz="1200"/>
+            </a:lvl1pPr>
+          </a:lstStyle>
+          <a:p>
+            <a:fld id="{48AA942D-1BC5-4C2C-8222-24209F07A2FD}" type="slidenum">
+              <a:rPr lang="en-IL" smtClean="0"/>
+              <a:t>‹#›</a:t>
+            </a:fld>
+            <a:endParaRPr lang="en-IL"/>
+          </a:p>
+        </p:txBody>
+      </p:sp>
+    </p:spTree>
+    <p:extLst>
+      <p:ext uri="{BB962C8B-B14F-4D97-AF65-F5344CB8AC3E}">
+        <p14:creationId xmlns:p14="http://schemas.microsoft.com/office/powerpoint/2010/main" val="174060965"/>
+      </p:ext>
+    </p:extLst>
+  </p:cSld>
+  <p:clrMap bg1="lt1" tx1="dk1" bg2="lt2" tx2="dk2" accent1="accent1" accent2="accent2" accent3="accent3" accent4="accent4" accent5="accent5" accent6="accent6" hlink="hlink" folHlink="folHlink"/>
+  <p:notesStyle>
+    <a:lvl1pPr marL="0" algn="l" defTabSz="914400" rtl="0" eaLnBrk="1" latinLnBrk="0" hangingPunct="1">
+      <a:defRPr sz="1200" kern="1200">
+        <a:solidFill>
+          <a:schemeClr val="tx1"/>
+        </a:solidFill>
+        <a:latin typeface="+mn-lt"/>
+        <a:ea typeface="+mn-ea"/>
+        <a:cs typeface="+mn-cs"/>
+      </a:defRPr>
+    </a:lvl1pPr>
+    <a:lvl2pPr marL="457200" algn="l" defTabSz="914400" rtl="0" eaLnBrk="1" latinLnBrk="0" hangingPunct="1">
+      <a:defRPr sz="1200" kern="1200">
+        <a:solidFill>
+          <a:schemeClr val="tx1"/>
+        </a:solidFill>
+        <a:latin typeface="+mn-lt"/>
+        <a:ea typeface="+mn-ea"/>
+        <a:cs typeface="+mn-cs"/>
+      </a:defRPr>
+    </a:lvl2pPr>
+    <a:lvl3pPr marL="914400" algn="l" defTabSz="914400" rtl="0" eaLnBrk="1" latinLnBrk="0" hangingPunct="1">
+      <a:defRPr sz="1200" kern="1200">
+        <a:solidFill>
+          <a:schemeClr val="tx1"/>
+        </a:solidFill>
+        <a:latin typeface="+mn-lt"/>
+        <a:ea typeface="+mn-ea"/>
+        <a:cs typeface="+mn-cs"/>
+      </a:defRPr>
+    </a:lvl3pPr>
+    <a:lvl4pPr marL="1371600" algn="l" defTabSz="914400" rtl="0" eaLnBrk="1" latinLnBrk="0" hangingPunct="1">
+      <a:defRPr sz="1200" kern="1200">
+        <a:solidFill>
+          <a:schemeClr val="tx1"/>
+        </a:solidFill>
+        <a:latin typeface="+mn-lt"/>
+        <a:ea typeface="+mn-ea"/>
+        <a:cs typeface="+mn-cs"/>
+      </a:defRPr>
+    </a:lvl4pPr>
+    <a:lvl5pPr marL="1828800" algn="l" defTabSz="914400" rtl="0" eaLnBrk="1" latinLnBrk="0" hangingPunct="1">
+      <a:defRPr sz="1200" kern="1200">
+        <a:solidFill>
+          <a:schemeClr val="tx1"/>
+        </a:solidFill>
+        <a:latin typeface="+mn-lt"/>
+        <a:ea typeface="+mn-ea"/>
+        <a:cs typeface="+mn-cs"/>
+      </a:defRPr>
+    </a:lvl5pPr>
+    <a:lvl6pPr marL="2286000" algn="l" defTabSz="914400" rtl="0" eaLnBrk="1" latinLnBrk="0" hangingPunct="1">
+      <a:defRPr sz="1200" kern="1200">
+        <a:solidFill>
+          <a:schemeClr val="tx1"/>
+        </a:solidFill>
+        <a:latin typeface="+mn-lt"/>
+        <a:ea typeface="+mn-ea"/>
+        <a:cs typeface="+mn-cs"/>
+      </a:defRPr>
+    </a:lvl6pPr>
+    <a:lvl7pPr marL="2743200" algn="l" defTabSz="914400" rtl="0" eaLnBrk="1" latinLnBrk="0" hangingPunct="1">
+      <a:defRPr sz="1200" kern="1200">
+        <a:solidFill>
+          <a:schemeClr val="tx1"/>
+        </a:solidFill>
+        <a:latin typeface="+mn-lt"/>
+        <a:ea typeface="+mn-ea"/>
+        <a:cs typeface="+mn-cs"/>
+      </a:defRPr>
+    </a:lvl7pPr>
+    <a:lvl8pPr marL="3200400" algn="l" defTabSz="914400" rtl="0" eaLnBrk="1" latinLnBrk="0" hangingPunct="1">
+      <a:defRPr sz="1200" kern="1200">
+        <a:solidFill>
+          <a:schemeClr val="tx1"/>
+        </a:solidFill>
+        <a:latin typeface="+mn-lt"/>
+        <a:ea typeface="+mn-ea"/>
+        <a:cs typeface="+mn-cs"/>
+      </a:defRPr>
+    </a:lvl8pPr>
+    <a:lvl9pPr marL="3657600" algn="l" defTabSz="914400" rtl="0" eaLnBrk="1" latinLnBrk="0" hangingPunct="1">
+      <a:defRPr sz="1200" kern="1200">
+        <a:solidFill>
+          <a:schemeClr val="tx1"/>
+        </a:solidFill>
+        <a:latin typeface="+mn-lt"/>
+        <a:ea typeface="+mn-ea"/>
+        <a:cs typeface="+mn-cs"/>
+      </a:defRPr>
+    </a:lvl9pPr>
+  </p:notesStyle>
+</p:notesMaster>
+</file>
+
+<file path=ppt/notesSlides/notesSlide1.xml><?xml version="1.0" encoding="utf-8"?>
+<p:notes xmlns:a="http://schemas.openxmlformats.org/drawingml/2006/main" xmlns:r="http://schemas.openxmlformats.org/officeDocument/2006/relationships" xmlns:p="http://schemas.openxmlformats.org/presentationml/2006/main">
+  <p:cSld>
+    <p:spTree>
+      <p:nvGrpSpPr>
+        <p:cNvPr id="1" name=""/>
+        <p:cNvGrpSpPr/>
+        <p:nvPr/>
+      </p:nvGrpSpPr>
+      <p:grpSpPr>
+        <a:xfrm>
+          <a:off x="0" y="0"/>
+          <a:ext cx="0" cy="0"/>
+          <a:chOff x="0" y="0"/>
+          <a:chExt cx="0" cy="0"/>
+        </a:xfrm>
+      </p:grpSpPr>
+      <p:sp>
+        <p:nvSpPr>
+          <p:cNvPr id="2" name="Slide Image Placeholder 1"/>
+          <p:cNvSpPr>
+            <a:spLocks noGrp="1" noRot="1" noChangeAspect="1"/>
+          </p:cNvSpPr>
+          <p:nvPr>
+            <p:ph type="sldImg"/>
+          </p:nvPr>
+        </p:nvSpPr>
+        <p:spPr/>
+      </p:sp>
+      <p:sp>
+        <p:nvSpPr>
+          <p:cNvPr id="3" name="Notes Placeholder 2"/>
+          <p:cNvSpPr>
+            <a:spLocks noGrp="1"/>
+          </p:cNvSpPr>
+          <p:nvPr>
+            <p:ph type="body" idx="1"/>
+          </p:nvPr>
+        </p:nvSpPr>
+        <p:spPr/>
+        <p:txBody>
+          <a:bodyPr/>
+          <a:lstStyle/>
+          <a:p>
+            <a:r>
+              <a:rPr lang="he-IL" dirty="0"/>
+              <a:t>אצלי יצא שהכל 0.74, זה הגיוני שאצלך יש אחד שהוא 0.75?</a:t>
+            </a:r>
+            <a:endParaRPr lang="en-IL" dirty="0"/>
+          </a:p>
+        </p:txBody>
+      </p:sp>
+      <p:sp>
+        <p:nvSpPr>
+          <p:cNvPr id="4" name="Slide Number Placeholder 3"/>
+          <p:cNvSpPr>
+            <a:spLocks noGrp="1"/>
+          </p:cNvSpPr>
+          <p:nvPr>
+            <p:ph type="sldNum" sz="quarter" idx="5"/>
+          </p:nvPr>
+        </p:nvSpPr>
+        <p:spPr/>
+        <p:txBody>
+          <a:bodyPr/>
+          <a:lstStyle/>
+          <a:p>
+            <a:fld id="{48AA942D-1BC5-4C2C-8222-24209F07A2FD}" type="slidenum">
+              <a:rPr lang="en-IL" smtClean="0"/>
+              <a:t>15</a:t>
+            </a:fld>
+            <a:endParaRPr lang="en-IL"/>
+          </a:p>
+        </p:txBody>
+      </p:sp>
+    </p:spTree>
+    <p:extLst>
+      <p:ext uri="{BB962C8B-B14F-4D97-AF65-F5344CB8AC3E}">
+        <p14:creationId xmlns:p14="http://schemas.microsoft.com/office/powerpoint/2010/main" val="3935306625"/>
+      </p:ext>
+    </p:extLst>
+  </p:cSld>
+  <p:clrMapOvr>
+    <a:masterClrMapping/>
+  </p:clrMapOvr>
+</p:notes>
+</file>
+
+<file path=ppt/notesSlides/notesSlide2.xml><?xml version="1.0" encoding="utf-8"?>
+<p:notes xmlns:a="http://schemas.openxmlformats.org/drawingml/2006/main" xmlns:r="http://schemas.openxmlformats.org/officeDocument/2006/relationships" xmlns:p="http://schemas.openxmlformats.org/presentationml/2006/main">
+  <p:cSld>
+    <p:spTree>
+      <p:nvGrpSpPr>
+        <p:cNvPr id="1" name=""/>
+        <p:cNvGrpSpPr/>
+        <p:nvPr/>
+      </p:nvGrpSpPr>
+      <p:grpSpPr>
+        <a:xfrm>
+          <a:off x="0" y="0"/>
+          <a:ext cx="0" cy="0"/>
+          <a:chOff x="0" y="0"/>
+          <a:chExt cx="0" cy="0"/>
+        </a:xfrm>
+      </p:grpSpPr>
+      <p:sp>
+        <p:nvSpPr>
+          <p:cNvPr id="2" name="Slide Image Placeholder 1"/>
+          <p:cNvSpPr>
+            <a:spLocks noGrp="1" noRot="1" noChangeAspect="1"/>
+          </p:cNvSpPr>
+          <p:nvPr>
+            <p:ph type="sldImg"/>
+          </p:nvPr>
+        </p:nvSpPr>
+        <p:spPr/>
+      </p:sp>
+      <p:sp>
+        <p:nvSpPr>
+          <p:cNvPr id="3" name="Notes Placeholder 2"/>
+          <p:cNvSpPr>
+            <a:spLocks noGrp="1"/>
+          </p:cNvSpPr>
+          <p:nvPr>
+            <p:ph type="body" idx="1"/>
+          </p:nvPr>
+        </p:nvSpPr>
+        <p:spPr/>
+        <p:txBody>
+          <a:bodyPr/>
+          <a:lstStyle/>
+          <a:p>
+            <a:r>
+              <a:rPr lang="he-IL" dirty="0"/>
+              <a:t>האם זה סבבה שהמוסברות עבור גרדיאנט בוסטינג ולוג' ריגרסיון הם שונים?</a:t>
+            </a:r>
+            <a:endParaRPr lang="en-IL" dirty="0"/>
+          </a:p>
+        </p:txBody>
+      </p:sp>
+      <p:sp>
+        <p:nvSpPr>
+          <p:cNvPr id="4" name="Slide Number Placeholder 3"/>
+          <p:cNvSpPr>
+            <a:spLocks noGrp="1"/>
+          </p:cNvSpPr>
+          <p:nvPr>
+            <p:ph type="sldNum" sz="quarter" idx="5"/>
+          </p:nvPr>
+        </p:nvSpPr>
+        <p:spPr/>
+        <p:txBody>
+          <a:bodyPr/>
+          <a:lstStyle/>
+          <a:p>
+            <a:fld id="{48AA942D-1BC5-4C2C-8222-24209F07A2FD}" type="slidenum">
+              <a:rPr lang="en-IL" smtClean="0"/>
+              <a:t>17</a:t>
+            </a:fld>
+            <a:endParaRPr lang="en-IL"/>
+          </a:p>
+        </p:txBody>
+      </p:sp>
+    </p:spTree>
+    <p:extLst>
+      <p:ext uri="{BB962C8B-B14F-4D97-AF65-F5344CB8AC3E}">
+        <p14:creationId xmlns:p14="http://schemas.microsoft.com/office/powerpoint/2010/main" val="1687569442"/>
+      </p:ext>
+    </p:extLst>
+  </p:cSld>
+  <p:clrMapOvr>
+    <a:masterClrMapping/>
+  </p:clrMapOvr>
+</p:notes>
+</file>
+
 <file path=ppt/slideLayouts/slideLayout1.xml><?xml version="1.0" encoding="utf-8"?>
 <p:sldLayout xmlns:a="http://schemas.openxmlformats.org/drawingml/2006/main" xmlns:r="http://schemas.openxmlformats.org/officeDocument/2006/relationships" xmlns:p="http://schemas.openxmlformats.org/presentationml/2006/main" showMasterSp="0" type="title" preserve="1">
   <p:cSld name="Title Slide">
@@ -300,7 +829,7 @@
           <a:p>
             <a:fld id="{48A87A34-81AB-432B-8DAE-1953F412C126}" type="datetimeFigureOut">
               <a:rPr lang="en-US" smtClean="0"/>
-              <a:t>2/24/2021</a:t>
+              <a:t>3/3/2021</a:t>
             </a:fld>
             <a:endParaRPr lang="en-US" dirty="0"/>
           </a:p>
@@ -529,7 +1058,7 @@
             <a:fld id="{48A87A34-81AB-432B-8DAE-1953F412C126}" type="datetimeFigureOut">
               <a:rPr lang="en-US" smtClean="0"/>
               <a:pPr/>
-              <a:t>2/24/2021</a:t>
+              <a:t>3/3/2021</a:t>
             </a:fld>
             <a:endParaRPr lang="en-US" dirty="0"/>
           </a:p>
@@ -711,7 +1240,7 @@
             <a:fld id="{48A87A34-81AB-432B-8DAE-1953F412C126}" type="datetimeFigureOut">
               <a:rPr lang="en-US" smtClean="0"/>
               <a:pPr/>
-              <a:t>2/24/2021</a:t>
+              <a:t>3/3/2021</a:t>
             </a:fld>
             <a:endParaRPr lang="en-US" dirty="0"/>
           </a:p>
@@ -883,7 +1412,7 @@
             <a:fld id="{48A87A34-81AB-432B-8DAE-1953F412C126}" type="datetimeFigureOut">
               <a:rPr lang="en-US" smtClean="0"/>
               <a:pPr/>
-              <a:t>2/24/2021</a:t>
+              <a:t>3/3/2021</a:t>
             </a:fld>
             <a:endParaRPr lang="en-US" dirty="0"/>
           </a:p>
@@ -1138,7 +1667,7 @@
           <a:p>
             <a:fld id="{48A87A34-81AB-432B-8DAE-1953F412C126}" type="datetimeFigureOut">
               <a:rPr lang="en-US" smtClean="0"/>
-              <a:t>2/24/2021</a:t>
+              <a:t>3/3/2021</a:t>
             </a:fld>
             <a:endParaRPr lang="en-US" dirty="0"/>
           </a:p>
@@ -1465,7 +1994,7 @@
             <a:fld id="{48A87A34-81AB-432B-8DAE-1953F412C126}" type="datetimeFigureOut">
               <a:rPr lang="en-US" smtClean="0"/>
               <a:pPr/>
-              <a:t>2/24/2021</a:t>
+              <a:t>3/3/2021</a:t>
             </a:fld>
             <a:endParaRPr lang="en-US" dirty="0"/>
           </a:p>
@@ -1918,7 +2447,7 @@
             <a:fld id="{48A87A34-81AB-432B-8DAE-1953F412C126}" type="datetimeFigureOut">
               <a:rPr lang="en-US" smtClean="0"/>
               <a:pPr/>
-              <a:t>2/24/2021</a:t>
+              <a:t>3/3/2021</a:t>
             </a:fld>
             <a:endParaRPr lang="en-US" dirty="0"/>
           </a:p>
@@ -2037,7 +2566,7 @@
           <a:p>
             <a:fld id="{48A87A34-81AB-432B-8DAE-1953F412C126}" type="datetimeFigureOut">
               <a:rPr lang="en-US" smtClean="0"/>
-              <a:t>2/24/2021</a:t>
+              <a:t>3/3/2021</a:t>
             </a:fld>
             <a:endParaRPr lang="en-US" dirty="0"/>
           </a:p>
@@ -2132,7 +2661,7 @@
           <a:p>
             <a:fld id="{48A87A34-81AB-432B-8DAE-1953F412C126}" type="datetimeFigureOut">
               <a:rPr lang="en-US" smtClean="0"/>
-              <a:t>2/24/2021</a:t>
+              <a:t>3/3/2021</a:t>
             </a:fld>
             <a:endParaRPr lang="en-US" dirty="0"/>
           </a:p>
@@ -2420,7 +2949,7 @@
             <a:fld id="{48A87A34-81AB-432B-8DAE-1953F412C126}" type="datetimeFigureOut">
               <a:rPr lang="en-US" smtClean="0"/>
               <a:pPr/>
-              <a:t>2/24/2021</a:t>
+              <a:t>3/3/2021</a:t>
             </a:fld>
             <a:endParaRPr lang="en-US" dirty="0"/>
           </a:p>
@@ -2744,7 +3273,7 @@
             <a:fld id="{48A87A34-81AB-432B-8DAE-1953F412C126}" type="datetimeFigureOut">
               <a:rPr lang="en-US" smtClean="0"/>
               <a:pPr/>
-              <a:t>2/24/2021</a:t>
+              <a:t>3/3/2021</a:t>
             </a:fld>
             <a:endParaRPr lang="en-US" dirty="0"/>
           </a:p>
@@ -2999,7 +3528,7 @@
             <a:fld id="{48A87A34-81AB-432B-8DAE-1953F412C126}" type="datetimeFigureOut">
               <a:rPr lang="en-US" smtClean="0"/>
               <a:pPr/>
-              <a:t>2/24/2021</a:t>
+              <a:t>3/3/2021</a:t>
             </a:fld>
             <a:endParaRPr lang="en-US" dirty="0"/>
           </a:p>
@@ -3795,7 +4324,7 @@
           <a:p>
             <a:r>
               <a:rPr lang="en-US" dirty="0"/>
-              <a:t>Countries: USA has the majority of the observations (69%) and only 11 more countries has more than 0.5% of the observations.</a:t>
+              <a:t>Countries: USA has most of the observations (69%) and only 11 more countries has more than 0.5% of the observations.</a:t>
             </a:r>
           </a:p>
           <a:p>
@@ -3946,13 +4475,13 @@
           <a:p>
             <a:r>
               <a:rPr lang="en-US" sz="1900" dirty="0"/>
-              <a:t>With one-hot encoding we gave a specific feature for only countries with significant amount of surveys (more than 0.5%) and all the other countries gather together to one feature 'other'.</a:t>
+              <a:t>With one-hot encoding we gave a specific feature for only countries with significant number of surveys (more than 0.5%) and all the other countries gather to one feature 'other'.</a:t>
             </a:r>
           </a:p>
           <a:p>
             <a:r>
               <a:rPr lang="en-US" sz="1900" dirty="0"/>
-              <a:t>Normalize the data</a:t>
+              <a:t>Normalize the data.</a:t>
             </a:r>
           </a:p>
           <a:p>
@@ -3964,29 +4493,13 @@
           <a:p>
             <a:r>
               <a:rPr lang="en-US" sz="1900" dirty="0"/>
-              <a:t>We tried to use PCA for dimensionality reduction, due to </a:t>
-            </a:r>
-            <a:r>
-              <a:rPr lang="en-US" sz="1900" dirty="0" err="1"/>
-              <a:t>simalarity</a:t>
-            </a:r>
+              <a:t>We tried to use PCA for dimensionality reduction, due to similarity of personality traits distributions, but decided not to use it as the results didn't show beneficial output. </a:t>
+            </a:r>
+          </a:p>
+          <a:p>
             <a:r>
               <a:rPr lang="en-US" sz="1900" dirty="0"/>
-              <a:t> of personality traits distributions, but decided not to use it has the results didn't show beneficial output. </a:t>
-            </a:r>
-          </a:p>
-          <a:p>
-            <a:r>
-              <a:rPr lang="en-US" sz="1900" dirty="0"/>
-              <a:t>We tried to use K-means in order to see if there is a 'cultural' </a:t>
-            </a:r>
-            <a:r>
-              <a:rPr lang="en-US" sz="1900" dirty="0" err="1"/>
-              <a:t>diversety</a:t>
-            </a:r>
-            <a:r>
-              <a:rPr lang="en-US" sz="1900" dirty="0"/>
-              <a:t> (by countries regions), but decided not to use it has the results didn't show beneficial output.  </a:t>
+              <a:t>We tried to use K-means in order to see if there is a 'cultural' diversity (by countries regions) but decided not to use it has the results didn't show beneficial output.  </a:t>
             </a:r>
           </a:p>
           <a:p>
@@ -4131,7 +4644,7 @@
             </a:pPr>
             <a:r>
               <a:rPr lang="en-US" dirty="0"/>
-              <a:t>Logistic regression</a:t>
+              <a:t>Logistic Regression</a:t>
             </a:r>
           </a:p>
           <a:p>
@@ -4206,15 +4719,7 @@
             </a:r>
             <a:r>
               <a:rPr lang="en-US" dirty="0"/>
-              <a:t> </a:t>
-            </a:r>
-            <a:r>
-              <a:rPr lang="en-US" dirty="0" err="1"/>
-              <a:t>femal's</a:t>
-            </a:r>
-            <a:r>
-              <a:rPr lang="en-US" dirty="0"/>
-              <a:t> observations from </a:t>
+              <a:t> female's observations from </a:t>
             </a:r>
             <a:r>
               <a:rPr lang="en-US" dirty="0" err="1"/>
@@ -4262,7 +4767,7 @@
             </a:pPr>
             <a:r>
               <a:rPr lang="en-US" dirty="0"/>
-              <a:t>The data divided to Training set: 80%  and Test set:20%</a:t>
+              <a:t>The data was divided to Training set: 80%  and Test set: 20%</a:t>
             </a:r>
             <a:endParaRPr lang="en-IL" dirty="0"/>
           </a:p>
@@ -5253,7 +5758,7 @@
           <p:nvPr/>
         </p:nvPicPr>
         <p:blipFill>
-          <a:blip r:embed="rId2"/>
+          <a:blip r:embed="rId3"/>
           <a:stretch>
             <a:fillRect/>
           </a:stretch>
@@ -5283,14 +5788,14 @@
           <p:nvPr/>
         </p:nvPicPr>
         <p:blipFill>
-          <a:blip r:embed="rId3"/>
+          <a:blip r:embed="rId4"/>
           <a:stretch>
             <a:fillRect/>
           </a:stretch>
         </p:blipFill>
         <p:spPr>
           <a:xfrm>
-            <a:off x="3398599" y="3428999"/>
+            <a:off x="3398599" y="3475493"/>
             <a:ext cx="7662979" cy="3309151"/>
           </a:xfrm>
           <a:prstGeom prst="rect">
@@ -5298,6 +5803,200 @@
           </a:prstGeom>
         </p:spPr>
       </p:pic>
+      <p:sp>
+        <p:nvSpPr>
+          <p:cNvPr id="7" name="Title 1">
+            <a:extLst>
+              <a:ext uri="{FF2B5EF4-FFF2-40B4-BE49-F238E27FC236}">
+                <a16:creationId xmlns:a16="http://schemas.microsoft.com/office/drawing/2014/main" id="{731EA04A-7E21-44B2-8DBB-0E5D4D78DDE5}"/>
+              </a:ext>
+            </a:extLst>
+          </p:cNvPr>
+          <p:cNvSpPr txBox="1">
+            <a:spLocks/>
+          </p:cNvSpPr>
+          <p:nvPr/>
+        </p:nvSpPr>
+        <p:spPr>
+          <a:xfrm>
+            <a:off x="8668771" y="0"/>
+            <a:ext cx="1637602" cy="345754"/>
+          </a:xfrm>
+          <a:prstGeom prst="rect">
+            <a:avLst/>
+          </a:prstGeom>
+        </p:spPr>
+        <p:txBody>
+          <a:bodyPr vert="horz" lIns="91440" tIns="45720" rIns="91440" bIns="45720" rtlCol="0" anchor="b">
+            <a:normAutofit fontScale="77500" lnSpcReduction="20000"/>
+          </a:bodyPr>
+          <a:lstStyle>
+            <a:lvl1pPr algn="l" defTabSz="914400" rtl="0" eaLnBrk="1" latinLnBrk="0" hangingPunct="1">
+              <a:lnSpc>
+                <a:spcPct val="90000"/>
+              </a:lnSpc>
+              <a:spcBef>
+                <a:spcPct val="0"/>
+              </a:spcBef>
+              <a:buNone/>
+              <a:defRPr sz="4400" kern="1200" spc="-50" baseline="0">
+                <a:solidFill>
+                  <a:schemeClr val="tx1"/>
+                </a:solidFill>
+                <a:latin typeface="+mj-lt"/>
+                <a:ea typeface="+mj-ea"/>
+                <a:cs typeface="+mj-cs"/>
+              </a:defRPr>
+            </a:lvl1pPr>
+          </a:lstStyle>
+          <a:p>
+            <a:r>
+              <a:rPr lang="en-US" sz="1600" dirty="0" err="1">
+                <a:solidFill>
+                  <a:schemeClr val="bg1">
+                    <a:lumMod val="50000"/>
+                  </a:schemeClr>
+                </a:solidFill>
+              </a:rPr>
+              <a:t>Balanced_interacted</a:t>
+            </a:r>
+            <a:endParaRPr lang="en-US" sz="1600" dirty="0">
+              <a:solidFill>
+                <a:schemeClr val="bg1">
+                  <a:lumMod val="50000"/>
+                </a:schemeClr>
+              </a:solidFill>
+            </a:endParaRPr>
+          </a:p>
+        </p:txBody>
+      </p:sp>
+      <p:sp>
+        <p:nvSpPr>
+          <p:cNvPr id="10" name="Title 1">
+            <a:extLst>
+              <a:ext uri="{FF2B5EF4-FFF2-40B4-BE49-F238E27FC236}">
+                <a16:creationId xmlns:a16="http://schemas.microsoft.com/office/drawing/2014/main" id="{1488789B-D3E7-4D2A-B287-7318E39DEB90}"/>
+              </a:ext>
+            </a:extLst>
+          </p:cNvPr>
+          <p:cNvSpPr txBox="1">
+            <a:spLocks/>
+          </p:cNvSpPr>
+          <p:nvPr/>
+        </p:nvSpPr>
+        <p:spPr>
+          <a:xfrm>
+            <a:off x="3797761" y="6835"/>
+            <a:ext cx="1483295" cy="345754"/>
+          </a:xfrm>
+          <a:prstGeom prst="rect">
+            <a:avLst/>
+          </a:prstGeom>
+        </p:spPr>
+        <p:txBody>
+          <a:bodyPr vert="horz" lIns="91440" tIns="45720" rIns="91440" bIns="45720" rtlCol="0" anchor="b">
+            <a:normAutofit/>
+          </a:bodyPr>
+          <a:lstStyle>
+            <a:lvl1pPr algn="l" defTabSz="914400" rtl="0" eaLnBrk="1" latinLnBrk="0" hangingPunct="1">
+              <a:lnSpc>
+                <a:spcPct val="90000"/>
+              </a:lnSpc>
+              <a:spcBef>
+                <a:spcPct val="0"/>
+              </a:spcBef>
+              <a:buNone/>
+              <a:defRPr sz="4400" kern="1200" spc="-50" baseline="0">
+                <a:solidFill>
+                  <a:schemeClr val="tx1"/>
+                </a:solidFill>
+                <a:latin typeface="+mj-lt"/>
+                <a:ea typeface="+mj-ea"/>
+                <a:cs typeface="+mj-cs"/>
+              </a:defRPr>
+            </a:lvl1pPr>
+          </a:lstStyle>
+          <a:p>
+            <a:r>
+              <a:rPr lang="en-US" sz="1200" dirty="0" err="1">
+                <a:solidFill>
+                  <a:schemeClr val="bg1">
+                    <a:lumMod val="50000"/>
+                  </a:schemeClr>
+                </a:solidFill>
+              </a:rPr>
+              <a:t>Scaled_raw</a:t>
+            </a:r>
+            <a:endParaRPr lang="en-US" sz="1200" dirty="0">
+              <a:solidFill>
+                <a:schemeClr val="bg1">
+                  <a:lumMod val="50000"/>
+                </a:schemeClr>
+              </a:solidFill>
+            </a:endParaRPr>
+          </a:p>
+        </p:txBody>
+      </p:sp>
+      <p:sp>
+        <p:nvSpPr>
+          <p:cNvPr id="11" name="Title 1">
+            <a:extLst>
+              <a:ext uri="{FF2B5EF4-FFF2-40B4-BE49-F238E27FC236}">
+                <a16:creationId xmlns:a16="http://schemas.microsoft.com/office/drawing/2014/main" id="{E848E8F9-846E-455C-AB6A-7C9B6480A730}"/>
+              </a:ext>
+            </a:extLst>
+          </p:cNvPr>
+          <p:cNvSpPr txBox="1">
+            <a:spLocks/>
+          </p:cNvSpPr>
+          <p:nvPr/>
+        </p:nvSpPr>
+        <p:spPr>
+          <a:xfrm>
+            <a:off x="6282584" y="6835"/>
+            <a:ext cx="1483295" cy="345754"/>
+          </a:xfrm>
+          <a:prstGeom prst="rect">
+            <a:avLst/>
+          </a:prstGeom>
+        </p:spPr>
+        <p:txBody>
+          <a:bodyPr vert="horz" lIns="91440" tIns="45720" rIns="91440" bIns="45720" rtlCol="0" anchor="b">
+            <a:normAutofit/>
+          </a:bodyPr>
+          <a:lstStyle>
+            <a:lvl1pPr algn="l" defTabSz="914400" rtl="0" eaLnBrk="1" latinLnBrk="0" hangingPunct="1">
+              <a:lnSpc>
+                <a:spcPct val="90000"/>
+              </a:lnSpc>
+              <a:spcBef>
+                <a:spcPct val="0"/>
+              </a:spcBef>
+              <a:buNone/>
+              <a:defRPr sz="4400" kern="1200" spc="-50" baseline="0">
+                <a:solidFill>
+                  <a:schemeClr val="tx1"/>
+                </a:solidFill>
+                <a:latin typeface="+mj-lt"/>
+                <a:ea typeface="+mj-ea"/>
+                <a:cs typeface="+mj-cs"/>
+              </a:defRPr>
+            </a:lvl1pPr>
+          </a:lstStyle>
+          <a:p>
+            <a:r>
+              <a:rPr lang="en-US" sz="1200" dirty="0">
+                <a:solidFill>
+                  <a:schemeClr val="bg1">
+                    <a:lumMod val="50000"/>
+                  </a:schemeClr>
+                </a:solidFill>
+              </a:rPr>
+              <a:t>Balanced</a:t>
+            </a:r>
+          </a:p>
+        </p:txBody>
+      </p:sp>
     </p:spTree>
     <p:extLst>
       <p:ext uri="{BB962C8B-B14F-4D97-AF65-F5344CB8AC3E}">
@@ -5914,7 +6613,7 @@
           <p:nvPr/>
         </p:nvPicPr>
         <p:blipFill>
-          <a:blip r:embed="rId2"/>
+          <a:blip r:embed="rId3"/>
           <a:stretch>
             <a:fillRect/>
           </a:stretch>
@@ -5944,7 +6643,7 @@
           <p:nvPr/>
         </p:nvPicPr>
         <p:blipFill>
-          <a:blip r:embed="rId3"/>
+          <a:blip r:embed="rId4"/>
           <a:stretch>
             <a:fillRect/>
           </a:stretch>
@@ -5974,7 +6673,7 @@
           <p:nvPr/>
         </p:nvPicPr>
         <p:blipFill>
-          <a:blip r:embed="rId4"/>
+          <a:blip r:embed="rId5"/>
           <a:stretch>
             <a:fillRect/>
           </a:stretch>
@@ -6004,7 +6703,7 @@
           <p:nvPr/>
         </p:nvPicPr>
         <p:blipFill>
-          <a:blip r:embed="rId5"/>
+          <a:blip r:embed="rId6"/>
           <a:stretch>
             <a:fillRect/>
           </a:stretch>
@@ -6144,13 +6843,8 @@
             </a:r>
             <a:r>
               <a:rPr lang="en-US" sz="2800" dirty="0"/>
-              <a:t>Gradient Boosting - </a:t>
-            </a:r>
-            <a:r>
-              <a:rPr lang="en-US" sz="2800" dirty="0" err="1"/>
-              <a:t>Shap</a:t>
-            </a:r>
-            <a:endParaRPr lang="en-US" sz="2800" dirty="0"/>
+              <a:t>Gradient Boosting - SHAP</a:t>
+            </a:r>
           </a:p>
           <a:p>
             <a:r>
@@ -6304,13 +6998,8 @@
             </a:r>
             <a:r>
               <a:rPr lang="en-US" sz="2800" dirty="0"/>
-              <a:t>Gradient Boosting - </a:t>
-            </a:r>
-            <a:r>
-              <a:rPr lang="en-US" sz="2800" dirty="0" err="1"/>
-              <a:t>Shap</a:t>
-            </a:r>
-            <a:endParaRPr lang="en-US" sz="2800" dirty="0"/>
+              <a:t>Gradient Boosting - SHAP</a:t>
+            </a:r>
           </a:p>
           <a:p>
             <a:r>
@@ -6799,13 +7488,8 @@
             </a:r>
             <a:r>
               <a:rPr lang="en-US" sz="2800" dirty="0"/>
-              <a:t>Gradient Boosting - </a:t>
-            </a:r>
-            <a:r>
-              <a:rPr lang="en-US" sz="2800" dirty="0" err="1"/>
-              <a:t>Shap</a:t>
-            </a:r>
-            <a:endParaRPr lang="en-US" sz="2800" dirty="0"/>
+              <a:t>Gradient Boosting - SHAP</a:t>
+            </a:r>
           </a:p>
           <a:p>
             <a:r>
@@ -6954,12 +7638,8 @@
           </a:lstStyle>
           <a:p>
             <a:r>
-              <a:rPr lang="en-US" dirty="0"/>
-              <a:t>Conclusions – </a:t>
-            </a:r>
-            <a:r>
-              <a:rPr lang="en-US" sz="2800" dirty="0"/>
-              <a:t>ROC curve</a:t>
+              <a:rPr lang="en-US"/>
+              <a:t>Conclusions</a:t>
             </a:r>
             <a:endParaRPr lang="en-IL" sz="2800" dirty="0"/>
           </a:p>
@@ -6990,7 +7670,7 @@
         </p:spPr>
         <p:txBody>
           <a:bodyPr vert="horz" lIns="91440" tIns="45720" rIns="91440" bIns="45720" rtlCol="0">
-            <a:normAutofit/>
+            <a:normAutofit fontScale="85000" lnSpcReduction="20000"/>
           </a:bodyPr>
           <a:lstStyle>
             <a:lvl1pPr marL="182880" indent="-182880" algn="l" defTabSz="914400" rtl="0" eaLnBrk="1" latinLnBrk="0" hangingPunct="1">
@@ -7236,29 +7916,154 @@
             </a:lvl9pPr>
           </a:lstStyle>
           <a:p>
-            <a:pPr marL="0" indent="0">
+            <a:pPr>
               <a:lnSpc>
                 <a:spcPct val="85000"/>
               </a:lnSpc>
-              <a:buFont typeface="Arial" pitchFamily="34" charset="0"/>
-              <a:buNone/>
             </a:pPr>
             <a:r>
               <a:rPr lang="en-US" dirty="0"/>
-              <a:t>We learn that…</a:t>
-            </a:r>
-          </a:p>
-          <a:p>
-            <a:pPr marL="0" indent="0">
+              <a:t>At first glance and a relatively basic run - women have on average a higher score in the Big Five traits but not at a level that can be used for prediction.</a:t>
+            </a:r>
+          </a:p>
+          <a:p>
+            <a:pPr>
               <a:lnSpc>
                 <a:spcPct val="85000"/>
               </a:lnSpc>
-              <a:buFont typeface="Arial" pitchFamily="34" charset="0"/>
-              <a:buNone/>
             </a:pPr>
-            <a:endParaRPr lang="en-US" dirty="0"/>
-          </a:p>
-          <a:p>
+            <a:r>
+              <a:rPr lang="en-US" dirty="0"/>
+              <a:t>Using the age feature preserved the relative advantage of women over men in scores but not at a significant level.</a:t>
+            </a:r>
+          </a:p>
+          <a:p>
+            <a:r>
+              <a:rPr lang="en-US" dirty="0">
+                <a:solidFill>
+                  <a:srgbClr val="000000"/>
+                </a:solidFill>
+                <a:effectLst/>
+              </a:rPr>
+              <a:t>We assumed that a division into "Western / Eastern culture" could lead us to a better separation of the traits over gender, but we did not achieve any success.</a:t>
+            </a:r>
+          </a:p>
+          <a:p>
+            <a:r>
+              <a:rPr lang="en-US" dirty="0">
+                <a:solidFill>
+                  <a:srgbClr val="000000"/>
+                </a:solidFill>
+                <a:effectLst/>
+              </a:rPr>
+              <a:t>Before balancing the data, it was possible to better predict women - not surprisingly since there was more data of women. Once the data was balanced to suit the global population - the prediction for women and men was also balanced and led to equality in the success of True Positive for both gender. Using the traits interaction bounced back the prediction for the women but </a:t>
+            </a:r>
+            <a:r>
+              <a:rPr lang="en-US" dirty="0">
+                <a:solidFill>
+                  <a:srgbClr val="000000"/>
+                </a:solidFill>
+              </a:rPr>
+              <a:t>hurt</a:t>
+            </a:r>
+            <a:r>
+              <a:rPr lang="en-US" dirty="0">
+                <a:solidFill>
+                  <a:srgbClr val="000000"/>
+                </a:solidFill>
+                <a:effectLst/>
+              </a:rPr>
+              <a:t> the prediction in the men </a:t>
+            </a:r>
+            <a:r>
+              <a:rPr lang="en-US" dirty="0">
+                <a:solidFill>
+                  <a:srgbClr val="000000"/>
+                </a:solidFill>
+                <a:effectLst/>
+                <a:highlight>
+                  <a:srgbClr val="FF0000"/>
+                </a:highlight>
+              </a:rPr>
+              <a:t>(why?)</a:t>
+            </a:r>
+          </a:p>
+          <a:p>
+            <a:pPr>
+              <a:lnSpc>
+                <a:spcPct val="85000"/>
+              </a:lnSpc>
+            </a:pPr>
+            <a:r>
+              <a:rPr lang="en-US" dirty="0"/>
+              <a:t>For unbalanced data - one can see that the best explanation is neuroticism, and indeed from looking at the graphs - they have the largest gap (same gap was preserved over the preprocessing) </a:t>
+            </a:r>
+            <a:r>
+              <a:rPr lang="he-IL" dirty="0"/>
+              <a:t> </a:t>
+            </a:r>
+            <a:r>
+              <a:rPr lang="en-US" dirty="0"/>
+              <a:t>.</a:t>
+            </a:r>
+          </a:p>
+          <a:p>
+            <a:pPr>
+              <a:lnSpc>
+                <a:spcPct val="85000"/>
+              </a:lnSpc>
+            </a:pPr>
+            <a:r>
+              <a:rPr lang="en-US" dirty="0">
+                <a:solidFill>
+                  <a:srgbClr val="000000"/>
+                </a:solidFill>
+                <a:effectLst/>
+              </a:rPr>
+              <a:t>Looking at the first two types of data, the features that best explain the models are openness and neuroticism (high neuroticism is more likely to be a woman), and as we can see - these are the two extremes in our original graphs.</a:t>
+            </a:r>
+            <a:endParaRPr lang="he-IL" dirty="0">
+              <a:solidFill>
+                <a:srgbClr val="000000"/>
+              </a:solidFill>
+              <a:effectLst/>
+            </a:endParaRPr>
+          </a:p>
+          <a:p>
+            <a:pPr>
+              <a:lnSpc>
+                <a:spcPct val="85000"/>
+              </a:lnSpc>
+            </a:pPr>
+            <a:r>
+              <a:rPr lang="en-US" dirty="0">
+                <a:solidFill>
+                  <a:srgbClr val="000000"/>
+                </a:solidFill>
+                <a:effectLst/>
+              </a:rPr>
+              <a:t>Looking at the latest data type, the features that best explain the models are neuroticism interactions with other characteristics (high score in neuroticism*agreeable is more likely to be a woman), but the score of the best explanator is still lower than the best explanator in the two initial data types.</a:t>
+            </a:r>
+            <a:endParaRPr lang="he-IL" dirty="0">
+              <a:solidFill>
+                <a:srgbClr val="000000"/>
+              </a:solidFill>
+              <a:effectLst/>
+            </a:endParaRPr>
+          </a:p>
+          <a:p>
+            <a:pPr>
+              <a:lnSpc>
+                <a:spcPct val="85000"/>
+              </a:lnSpc>
+            </a:pPr>
+            <a:r>
+              <a:rPr lang="en-US" dirty="0"/>
+              <a:t>In the end, the action that led to the most drastic change (in confusion matrix) was the balance of data.</a:t>
+            </a:r>
+          </a:p>
+          <a:p>
+            <a:pPr algn="r" rtl="1"/>
             <a:endParaRPr lang="en-IL" dirty="0"/>
           </a:p>
         </p:txBody>
@@ -7312,7 +8117,7 @@
         <p:spPr>
           <a:xfrm>
             <a:off x="913774" y="1716946"/>
-            <a:ext cx="10364452" cy="3424107"/>
+            <a:ext cx="10364452" cy="4872342"/>
           </a:xfrm>
         </p:spPr>
         <p:txBody>
@@ -7321,7 +8126,326 @@
           </a:bodyPr>
           <a:lstStyle/>
           <a:p>
-            <a:endParaRPr lang="en-IL" dirty="0"/>
+            <a:r>
+              <a:rPr lang="en-US" sz="1700" dirty="0">
+                <a:solidFill>
+                  <a:srgbClr val="202122"/>
+                </a:solidFill>
+                <a:latin typeface="Arial" panose="020B0604020202020204" pitchFamily="34" charset="0"/>
+              </a:rPr>
+              <a:t>The scientific debate on gender differences in personality traits ranges from claiming that gender differences are close to zero¹ to the view that they have been obscured by methodological limitations and are actually very large², and a variety of positions in between³.</a:t>
+            </a:r>
+          </a:p>
+          <a:p>
+            <a:pPr lvl="1"/>
+            <a:r>
+              <a:rPr lang="en-US" sz="1400" b="0" i="0" dirty="0">
+                <a:solidFill>
+                  <a:srgbClr val="222222"/>
+                </a:solidFill>
+                <a:effectLst/>
+                <a:latin typeface="Arial" panose="020B0604020202020204" pitchFamily="34" charset="0"/>
+              </a:rPr>
+              <a:t>Hyde, J.S., 2005. The gender similarities hypothesis. </a:t>
+            </a:r>
+            <a:r>
+              <a:rPr lang="en-US" sz="1400" b="0" i="1" dirty="0">
+                <a:solidFill>
+                  <a:srgbClr val="222222"/>
+                </a:solidFill>
+                <a:effectLst/>
+                <a:latin typeface="Arial" panose="020B0604020202020204" pitchFamily="34" charset="0"/>
+              </a:rPr>
+              <a:t>American psychologist</a:t>
+            </a:r>
+            <a:r>
+              <a:rPr lang="en-US" sz="1400" b="0" i="0" dirty="0">
+                <a:solidFill>
+                  <a:srgbClr val="222222"/>
+                </a:solidFill>
+                <a:effectLst/>
+                <a:latin typeface="Arial" panose="020B0604020202020204" pitchFamily="34" charset="0"/>
+              </a:rPr>
+              <a:t>, </a:t>
+            </a:r>
+            <a:r>
+              <a:rPr lang="en-US" sz="1400" b="0" i="1" dirty="0">
+                <a:solidFill>
+                  <a:srgbClr val="222222"/>
+                </a:solidFill>
+                <a:effectLst/>
+                <a:latin typeface="Arial" panose="020B0604020202020204" pitchFamily="34" charset="0"/>
+              </a:rPr>
+              <a:t>60</a:t>
+            </a:r>
+            <a:r>
+              <a:rPr lang="en-US" sz="1400" b="0" i="0" dirty="0">
+                <a:solidFill>
+                  <a:srgbClr val="222222"/>
+                </a:solidFill>
+                <a:effectLst/>
+                <a:latin typeface="Arial" panose="020B0604020202020204" pitchFamily="34" charset="0"/>
+              </a:rPr>
+              <a:t>(6), p.581.</a:t>
+            </a:r>
+          </a:p>
+          <a:p>
+            <a:pPr lvl="1"/>
+            <a:r>
+              <a:rPr lang="en-US" sz="1400" b="0" i="0" dirty="0">
+                <a:solidFill>
+                  <a:srgbClr val="222222"/>
+                </a:solidFill>
+                <a:effectLst/>
+                <a:latin typeface="Arial" panose="020B0604020202020204" pitchFamily="34" charset="0"/>
+              </a:rPr>
+              <a:t>Del Giudice, M., Booth, T. and </a:t>
+            </a:r>
+            <a:r>
+              <a:rPr lang="en-US" sz="1400" b="0" i="0" dirty="0" err="1">
+                <a:solidFill>
+                  <a:srgbClr val="222222"/>
+                </a:solidFill>
+                <a:effectLst/>
+                <a:latin typeface="Arial" panose="020B0604020202020204" pitchFamily="34" charset="0"/>
+              </a:rPr>
+              <a:t>Irwing</a:t>
+            </a:r>
+            <a:r>
+              <a:rPr lang="en-US" sz="1400" b="0" i="0" dirty="0">
+                <a:solidFill>
+                  <a:srgbClr val="222222"/>
+                </a:solidFill>
+                <a:effectLst/>
+                <a:latin typeface="Arial" panose="020B0604020202020204" pitchFamily="34" charset="0"/>
+              </a:rPr>
+              <a:t>, P., 2012. The distance between Mars and Venus: Measuring global sex differences in personality. </a:t>
+            </a:r>
+            <a:r>
+              <a:rPr lang="en-US" sz="1400" b="0" i="1" dirty="0" err="1">
+                <a:solidFill>
+                  <a:srgbClr val="222222"/>
+                </a:solidFill>
+                <a:effectLst/>
+                <a:latin typeface="Arial" panose="020B0604020202020204" pitchFamily="34" charset="0"/>
+              </a:rPr>
+              <a:t>PloS</a:t>
+            </a:r>
+            <a:r>
+              <a:rPr lang="en-US" sz="1400" b="0" i="1" dirty="0">
+                <a:solidFill>
+                  <a:srgbClr val="222222"/>
+                </a:solidFill>
+                <a:effectLst/>
+                <a:latin typeface="Arial" panose="020B0604020202020204" pitchFamily="34" charset="0"/>
+              </a:rPr>
+              <a:t> one</a:t>
+            </a:r>
+            <a:r>
+              <a:rPr lang="en-US" sz="1400" b="0" i="0" dirty="0">
+                <a:solidFill>
+                  <a:srgbClr val="222222"/>
+                </a:solidFill>
+                <a:effectLst/>
+                <a:latin typeface="Arial" panose="020B0604020202020204" pitchFamily="34" charset="0"/>
+              </a:rPr>
+              <a:t>, </a:t>
+            </a:r>
+            <a:r>
+              <a:rPr lang="en-US" sz="1400" b="0" i="1" dirty="0">
+                <a:solidFill>
+                  <a:srgbClr val="222222"/>
+                </a:solidFill>
+                <a:effectLst/>
+                <a:latin typeface="Arial" panose="020B0604020202020204" pitchFamily="34" charset="0"/>
+              </a:rPr>
+              <a:t>7</a:t>
+            </a:r>
+            <a:r>
+              <a:rPr lang="en-US" sz="1400" b="0" i="0" dirty="0">
+                <a:solidFill>
+                  <a:srgbClr val="222222"/>
+                </a:solidFill>
+                <a:effectLst/>
+                <a:latin typeface="Arial" panose="020B0604020202020204" pitchFamily="34" charset="0"/>
+              </a:rPr>
+              <a:t>(1), p.e29265.</a:t>
+            </a:r>
+          </a:p>
+          <a:p>
+            <a:pPr lvl="1"/>
+            <a:r>
+              <a:rPr lang="en-US" sz="1400" dirty="0" err="1">
+                <a:solidFill>
+                  <a:srgbClr val="222222"/>
+                </a:solidFill>
+                <a:latin typeface="Arial" panose="020B0604020202020204" pitchFamily="34" charset="0"/>
+              </a:rPr>
+              <a:t>Lippa</a:t>
+            </a:r>
+            <a:r>
+              <a:rPr lang="en-US" sz="1400" dirty="0">
+                <a:solidFill>
+                  <a:srgbClr val="222222"/>
+                </a:solidFill>
+                <a:latin typeface="Arial" panose="020B0604020202020204" pitchFamily="34" charset="0"/>
+              </a:rPr>
+              <a:t>, R.A., 2006. The gender reality hypothesis.</a:t>
+            </a:r>
+          </a:p>
+          <a:p>
+            <a:r>
+              <a:rPr lang="en-US" sz="1700" dirty="0">
+                <a:solidFill>
+                  <a:srgbClr val="202122"/>
+                </a:solidFill>
+                <a:latin typeface="Arial" panose="020B0604020202020204" pitchFamily="34" charset="0"/>
+              </a:rPr>
+              <a:t>Previous works show women report higher levels of Agreeableness, Conscientiousness, Extraversion and Neuroticism. Contrary to predictions from evolutionary theory, the magnitude of gender differences varied across cultures.</a:t>
+            </a:r>
+          </a:p>
+          <a:p>
+            <a:pPr lvl="1"/>
+            <a:r>
+              <a:rPr lang="en-US" sz="1400" b="0" i="0" dirty="0">
+                <a:solidFill>
+                  <a:srgbClr val="222222"/>
+                </a:solidFill>
+                <a:effectLst/>
+                <a:latin typeface="Arial" panose="020B0604020202020204" pitchFamily="34" charset="0"/>
+              </a:rPr>
+              <a:t>Costa Jr, P.T., </a:t>
+            </a:r>
+            <a:r>
+              <a:rPr lang="en-US" sz="1400" b="0" i="0" dirty="0" err="1">
+                <a:solidFill>
+                  <a:srgbClr val="222222"/>
+                </a:solidFill>
+                <a:effectLst/>
+                <a:latin typeface="Arial" panose="020B0604020202020204" pitchFamily="34" charset="0"/>
+              </a:rPr>
+              <a:t>Terracciano</a:t>
+            </a:r>
+            <a:r>
+              <a:rPr lang="en-US" sz="1400" b="0" i="0" dirty="0">
+                <a:solidFill>
+                  <a:srgbClr val="222222"/>
+                </a:solidFill>
+                <a:effectLst/>
+                <a:latin typeface="Arial" panose="020B0604020202020204" pitchFamily="34" charset="0"/>
+              </a:rPr>
+              <a:t>, A. and McCrae, R.R., 2001. Gender differences in personality traits across cultures: robust and surprising findings. </a:t>
+            </a:r>
+            <a:r>
+              <a:rPr lang="en-US" sz="1400" b="0" i="1" dirty="0">
+                <a:solidFill>
+                  <a:srgbClr val="222222"/>
+                </a:solidFill>
+                <a:effectLst/>
+                <a:latin typeface="Arial" panose="020B0604020202020204" pitchFamily="34" charset="0"/>
+              </a:rPr>
+              <a:t>Journal of personality and social psychology</a:t>
+            </a:r>
+            <a:r>
+              <a:rPr lang="en-US" sz="1400" b="0" i="0" dirty="0">
+                <a:solidFill>
+                  <a:srgbClr val="222222"/>
+                </a:solidFill>
+                <a:effectLst/>
+                <a:latin typeface="Arial" panose="020B0604020202020204" pitchFamily="34" charset="0"/>
+              </a:rPr>
+              <a:t>, </a:t>
+            </a:r>
+            <a:r>
+              <a:rPr lang="en-US" sz="1400" b="0" i="1" dirty="0">
+                <a:solidFill>
+                  <a:srgbClr val="222222"/>
+                </a:solidFill>
+                <a:effectLst/>
+                <a:latin typeface="Arial" panose="020B0604020202020204" pitchFamily="34" charset="0"/>
+              </a:rPr>
+              <a:t>81</a:t>
+            </a:r>
+            <a:r>
+              <a:rPr lang="en-US" sz="1400" b="0" i="0" dirty="0">
+                <a:solidFill>
+                  <a:srgbClr val="222222"/>
+                </a:solidFill>
+                <a:effectLst/>
+                <a:latin typeface="Arial" panose="020B0604020202020204" pitchFamily="34" charset="0"/>
+              </a:rPr>
+              <a:t>(2), p.322.</a:t>
+            </a:r>
+            <a:endParaRPr lang="en-US" sz="1400" dirty="0">
+              <a:solidFill>
+                <a:srgbClr val="222222"/>
+              </a:solidFill>
+              <a:latin typeface="Arial" panose="020B0604020202020204" pitchFamily="34" charset="0"/>
+            </a:endParaRPr>
+          </a:p>
+          <a:p>
+            <a:r>
+              <a:rPr lang="en-US" sz="1700" dirty="0">
+                <a:solidFill>
+                  <a:srgbClr val="202122"/>
+                </a:solidFill>
+                <a:latin typeface="Arial" panose="020B0604020202020204" pitchFamily="34" charset="0"/>
+              </a:rPr>
+              <a:t>Because the domains of the Big Five are so broad and encompass a variety of personality characteristics, greater specificity is needed to uncover where gender differences truly lie.</a:t>
+            </a:r>
+          </a:p>
+          <a:p>
+            <a:pPr lvl="1"/>
+            <a:r>
+              <a:rPr lang="en-US" sz="1400" b="0" i="0" dirty="0">
+                <a:solidFill>
+                  <a:srgbClr val="222222"/>
+                </a:solidFill>
+                <a:effectLst/>
+                <a:latin typeface="Arial" panose="020B0604020202020204" pitchFamily="34" charset="0"/>
+              </a:rPr>
+              <a:t>Weisberg, Y.J., DeYoung, C.G. and Hirsh, J.B., 2011. Gender differences in personality across the ten aspects of the Big Five. </a:t>
+            </a:r>
+            <a:r>
+              <a:rPr lang="en-US" sz="1400" b="0" i="1" dirty="0">
+                <a:solidFill>
+                  <a:srgbClr val="222222"/>
+                </a:solidFill>
+                <a:effectLst/>
+                <a:latin typeface="Arial" panose="020B0604020202020204" pitchFamily="34" charset="0"/>
+              </a:rPr>
+              <a:t>Frontiers in psychology</a:t>
+            </a:r>
+            <a:r>
+              <a:rPr lang="en-US" sz="1400" b="0" i="0" dirty="0">
+                <a:solidFill>
+                  <a:srgbClr val="222222"/>
+                </a:solidFill>
+                <a:effectLst/>
+                <a:latin typeface="Arial" panose="020B0604020202020204" pitchFamily="34" charset="0"/>
+              </a:rPr>
+              <a:t>, </a:t>
+            </a:r>
+            <a:r>
+              <a:rPr lang="en-US" sz="1400" b="0" i="1" dirty="0">
+                <a:solidFill>
+                  <a:srgbClr val="222222"/>
+                </a:solidFill>
+                <a:effectLst/>
+                <a:latin typeface="Arial" panose="020B0604020202020204" pitchFamily="34" charset="0"/>
+              </a:rPr>
+              <a:t>2</a:t>
+            </a:r>
+            <a:r>
+              <a:rPr lang="en-US" sz="1400" b="0" i="0" dirty="0">
+                <a:solidFill>
+                  <a:srgbClr val="222222"/>
+                </a:solidFill>
+                <a:effectLst/>
+                <a:latin typeface="Arial" panose="020B0604020202020204" pitchFamily="34" charset="0"/>
+              </a:rPr>
+              <a:t>, p.178.</a:t>
+            </a:r>
           </a:p>
         </p:txBody>
       </p:sp>
@@ -7750,7 +8874,7 @@
           <p:nvPr>
             <p:extLst>
               <p:ext uri="{D42A27DB-BD31-4B8C-83A1-F6EECF244321}">
-                <p14:modId xmlns:p14="http://schemas.microsoft.com/office/powerpoint/2010/main" val="1692959715"/>
+                <p14:modId xmlns:p14="http://schemas.microsoft.com/office/powerpoint/2010/main" val="681365799"/>
               </p:ext>
             </p:extLst>
           </p:nvPr>
@@ -8652,10 +9776,10 @@
                     <a:p>
                       <a:pPr algn="l" fontAlgn="ctr"/>
                       <a:r>
-                        <a:rPr lang="en-US" sz="1400">
+                        <a:rPr lang="en-US" sz="1400" dirty="0">
                           <a:effectLst/>
                         </a:rPr>
-                        <a:t>South Afri</a:t>
+                        <a:t>SA</a:t>
                       </a:r>
                     </a:p>
                   </a:txBody>
@@ -11485,7 +12609,15 @@
             </a:pPr>
             <a:r>
               <a:rPr lang="en-US" dirty="0"/>
-              <a:t>The data has172 nan values in country feature.</a:t>
+              <a:t>The data has172 </a:t>
+            </a:r>
+            <a:r>
+              <a:rPr lang="en-US" dirty="0" err="1"/>
+              <a:t>NaN</a:t>
+            </a:r>
+            <a:r>
+              <a:rPr lang="en-US" dirty="0"/>
+              <a:t> values in country feature.</a:t>
             </a:r>
           </a:p>
           <a:p>
@@ -11495,7 +12627,15 @@
             </a:pPr>
             <a:r>
               <a:rPr lang="en-US" dirty="0"/>
-              <a:t>After removing rows with nan values here are the Mean and quantiles values of each numeric feature: </a:t>
+              <a:t>After removing rows with </a:t>
+            </a:r>
+            <a:r>
+              <a:rPr lang="en-US" dirty="0" err="1"/>
+              <a:t>NaN</a:t>
+            </a:r>
+            <a:r>
+              <a:rPr lang="en-US" dirty="0"/>
+              <a:t> values here are the Mean and quantiles values of each numeric feature: </a:t>
             </a:r>
           </a:p>
           <a:p>
@@ -11682,13 +12822,7 @@
             </a:r>
             <a:r>
               <a:rPr lang="en-US" sz="3000" dirty="0"/>
-              <a:t>Box plot of personality traits </a:t>
-            </a:r>
-          </a:p>
-          <a:p>
-            <a:r>
-              <a:rPr lang="en-US" sz="3000" dirty="0"/>
-              <a:t>comparing Male and Female</a:t>
+              <a:t>Box plot of personality traits comparing Male and Female</a:t>
             </a:r>
             <a:endParaRPr lang="en-IL" sz="3000" dirty="0"/>
           </a:p>
@@ -11940,49 +13074,36 @@
           </a:p>
         </p:txBody>
       </p:sp>
-      <p:sp>
-        <p:nvSpPr>
-          <p:cNvPr id="2" name="TextBox 1">
+      <p:pic>
+        <p:nvPicPr>
+          <p:cNvPr id="4" name="Picture 3" descr="A picture containing background pattern&#10;&#10;Description automatically generated">
             <a:extLst>
               <a:ext uri="{FF2B5EF4-FFF2-40B4-BE49-F238E27FC236}">
-                <a16:creationId xmlns:a16="http://schemas.microsoft.com/office/drawing/2014/main" id="{C358CCA8-835A-4A29-BB6C-B651CC03782D}"/>
+                <a16:creationId xmlns:a16="http://schemas.microsoft.com/office/drawing/2014/main" id="{37997BCF-6035-4301-B445-5AA468DAF9CA}"/>
               </a:ext>
             </a:extLst>
           </p:cNvPr>
-          <p:cNvSpPr txBox="1"/>
+          <p:cNvPicPr>
+            <a:picLocks noChangeAspect="1"/>
+          </p:cNvPicPr>
           <p:nvPr/>
-        </p:nvSpPr>
+        </p:nvPicPr>
+        <p:blipFill>
+          <a:blip r:embed="rId2"/>
+          <a:stretch>
+            <a:fillRect/>
+          </a:stretch>
+        </p:blipFill>
         <p:spPr>
           <a:xfrm>
-            <a:off x="4012707" y="2130641"/>
-            <a:ext cx="3559945" cy="646331"/>
+            <a:off x="1255363" y="1202943"/>
+            <a:ext cx="8485322" cy="5655057"/>
           </a:xfrm>
           <a:prstGeom prst="rect">
             <a:avLst/>
           </a:prstGeom>
-          <a:noFill/>
         </p:spPr>
-        <p:txBody>
-          <a:bodyPr wrap="square" rtlCol="0">
-            <a:spAutoFit/>
-          </a:bodyPr>
-          <a:lstStyle/>
-          <a:p>
-            <a:r>
-              <a:rPr lang="he-IL" dirty="0"/>
-              <a:t>תכניסי את הגרף</a:t>
-            </a:r>
-            <a:br>
-              <a:rPr lang="en-US" dirty="0"/>
-            </a:br>
-            <a:r>
-              <a:rPr lang="he-IL" dirty="0"/>
-              <a:t>אצלי זה בגוונים סגולים משום מה...</a:t>
-            </a:r>
-            <a:endParaRPr lang="en-IL" dirty="0"/>
-          </a:p>
-        </p:txBody>
-      </p:sp>
+      </p:pic>
     </p:spTree>
     <p:extLst>
       <p:ext uri="{BB962C8B-B14F-4D97-AF65-F5344CB8AC3E}">
@@ -12247,4 +13368,299 @@
     </a:ext>
   </a:extLst>
 </a:theme>
+</file>
+
+<file path=ppt/theme/theme2.xml><?xml version="1.0" encoding="utf-8"?>
+<a:theme xmlns:a="http://schemas.openxmlformats.org/drawingml/2006/main" name="Office Theme">
+  <a:themeElements>
+    <a:clrScheme name="Office">
+      <a:dk1>
+        <a:sysClr val="windowText" lastClr="000000"/>
+      </a:dk1>
+      <a:lt1>
+        <a:sysClr val="window" lastClr="FFFFFF"/>
+      </a:lt1>
+      <a:dk2>
+        <a:srgbClr val="44546A"/>
+      </a:dk2>
+      <a:lt2>
+        <a:srgbClr val="E7E6E6"/>
+      </a:lt2>
+      <a:accent1>
+        <a:srgbClr val="4472C4"/>
+      </a:accent1>
+      <a:accent2>
+        <a:srgbClr val="ED7D31"/>
+      </a:accent2>
+      <a:accent3>
+        <a:srgbClr val="A5A5A5"/>
+      </a:accent3>
+      <a:accent4>
+        <a:srgbClr val="FFC000"/>
+      </a:accent4>
+      <a:accent5>
+        <a:srgbClr val="5B9BD5"/>
+      </a:accent5>
+      <a:accent6>
+        <a:srgbClr val="70AD47"/>
+      </a:accent6>
+      <a:hlink>
+        <a:srgbClr val="0563C1"/>
+      </a:hlink>
+      <a:folHlink>
+        <a:srgbClr val="954F72"/>
+      </a:folHlink>
+    </a:clrScheme>
+    <a:fontScheme name="Office">
+      <a:majorFont>
+        <a:latin typeface="Calibri Light" panose="020F0302020204030204"/>
+        <a:ea typeface=""/>
+        <a:cs typeface=""/>
+        <a:font script="Jpan" typeface="游ゴシック Light"/>
+        <a:font script="Hang" typeface="맑은 고딕"/>
+        <a:font script="Hans" typeface="等线 Light"/>
+        <a:font script="Hant" typeface="新細明體"/>
+        <a:font script="Arab" typeface="Times New Roman"/>
+        <a:font script="Hebr" typeface="Times New Roman"/>
+        <a:font script="Thai" typeface="Angsana New"/>
+        <a:font script="Ethi" typeface="Nyala"/>
+        <a:font script="Beng" typeface="Vrinda"/>
+        <a:font script="Gujr" typeface="Shruti"/>
+        <a:font script="Khmr" typeface="MoolBoran"/>
+        <a:font script="Knda" typeface="Tunga"/>
+        <a:font script="Guru" typeface="Raavi"/>
+        <a:font script="Cans" typeface="Euphemia"/>
+        <a:font script="Cher" typeface="Plantagenet Cherokee"/>
+        <a:font script="Yiii" typeface="Microsoft Yi Baiti"/>
+        <a:font script="Tibt" typeface="Microsoft Himalaya"/>
+        <a:font script="Thaa" typeface="MV Boli"/>
+        <a:font script="Deva" typeface="Mangal"/>
+        <a:font script="Telu" typeface="Gautami"/>
+        <a:font script="Taml" typeface="Latha"/>
+        <a:font script="Syrc" typeface="Estrangelo Edessa"/>
+        <a:font script="Orya" typeface="Kalinga"/>
+        <a:font script="Mlym" typeface="Kartika"/>
+        <a:font script="Laoo" typeface="DokChampa"/>
+        <a:font script="Sinh" typeface="Iskoola Pota"/>
+        <a:font script="Mong" typeface="Mongolian Baiti"/>
+        <a:font script="Viet" typeface="Times New Roman"/>
+        <a:font script="Uigh" typeface="Microsoft Uighur"/>
+        <a:font script="Geor" typeface="Sylfaen"/>
+        <a:font script="Armn" typeface="Arial"/>
+        <a:font script="Bugi" typeface="Leelawadee UI"/>
+        <a:font script="Bopo" typeface="Microsoft JhengHei"/>
+        <a:font script="Java" typeface="Javanese Text"/>
+        <a:font script="Lisu" typeface="Segoe UI"/>
+        <a:font script="Mymr" typeface="Myanmar Text"/>
+        <a:font script="Nkoo" typeface="Ebrima"/>
+        <a:font script="Olck" typeface="Nirmala UI"/>
+        <a:font script="Osma" typeface="Ebrima"/>
+        <a:font script="Phag" typeface="Phagspa"/>
+        <a:font script="Syrn" typeface="Estrangelo Edessa"/>
+        <a:font script="Syrj" typeface="Estrangelo Edessa"/>
+        <a:font script="Syre" typeface="Estrangelo Edessa"/>
+        <a:font script="Sora" typeface="Nirmala UI"/>
+        <a:font script="Tale" typeface="Microsoft Tai Le"/>
+        <a:font script="Talu" typeface="Microsoft New Tai Lue"/>
+        <a:font script="Tfng" typeface="Ebrima"/>
+      </a:majorFont>
+      <a:minorFont>
+        <a:latin typeface="Calibri" panose="020F0502020204030204"/>
+        <a:ea typeface=""/>
+        <a:cs typeface=""/>
+        <a:font script="Jpan" typeface="游ゴシック"/>
+        <a:font script="Hang" typeface="맑은 고딕"/>
+        <a:font script="Hans" typeface="等线"/>
+        <a:font script="Hant" typeface="新細明體"/>
+        <a:font script="Arab" typeface="Arial"/>
+        <a:font script="Hebr" typeface="Arial"/>
+        <a:font script="Thai" typeface="Cordia New"/>
+        <a:font script="Ethi" typeface="Nyala"/>
+        <a:font script="Beng" typeface="Vrinda"/>
+        <a:font script="Gujr" typeface="Shruti"/>
+        <a:font script="Khmr" typeface="DaunPenh"/>
+        <a:font script="Knda" typeface="Tunga"/>
+        <a:font script="Guru" typeface="Raavi"/>
+        <a:font script="Cans" typeface="Euphemia"/>
+        <a:font script="Cher" typeface="Plantagenet Cherokee"/>
+        <a:font script="Yiii" typeface="Microsoft Yi Baiti"/>
+        <a:font script="Tibt" typeface="Microsoft Himalaya"/>
+        <a:font script="Thaa" typeface="MV Boli"/>
+        <a:font script="Deva" typeface="Mangal"/>
+        <a:font script="Telu" typeface="Gautami"/>
+        <a:font script="Taml" typeface="Latha"/>
+        <a:font script="Syrc" typeface="Estrangelo Edessa"/>
+        <a:font script="Orya" typeface="Kalinga"/>
+        <a:font script="Mlym" typeface="Kartika"/>
+        <a:font script="Laoo" typeface="DokChampa"/>
+        <a:font script="Sinh" typeface="Iskoola Pota"/>
+        <a:font script="Mong" typeface="Mongolian Baiti"/>
+        <a:font script="Viet" typeface="Arial"/>
+        <a:font script="Uigh" typeface="Microsoft Uighur"/>
+        <a:font script="Geor" typeface="Sylfaen"/>
+        <a:font script="Armn" typeface="Arial"/>
+        <a:font script="Bugi" typeface="Leelawadee UI"/>
+        <a:font script="Bopo" typeface="Microsoft JhengHei"/>
+        <a:font script="Java" typeface="Javanese Text"/>
+        <a:font script="Lisu" typeface="Segoe UI"/>
+        <a:font script="Mymr" typeface="Myanmar Text"/>
+        <a:font script="Nkoo" typeface="Ebrima"/>
+        <a:font script="Olck" typeface="Nirmala UI"/>
+        <a:font script="Osma" typeface="Ebrima"/>
+        <a:font script="Phag" typeface="Phagspa"/>
+        <a:font script="Syrn" typeface="Estrangelo Edessa"/>
+        <a:font script="Syrj" typeface="Estrangelo Edessa"/>
+        <a:font script="Syre" typeface="Estrangelo Edessa"/>
+        <a:font script="Sora" typeface="Nirmala UI"/>
+        <a:font script="Tale" typeface="Microsoft Tai Le"/>
+        <a:font script="Talu" typeface="Microsoft New Tai Lue"/>
+        <a:font script="Tfng" typeface="Ebrima"/>
+      </a:minorFont>
+    </a:fontScheme>
+    <a:fmtScheme name="Office">
+      <a:fillStyleLst>
+        <a:solidFill>
+          <a:schemeClr val="phClr"/>
+        </a:solidFill>
+        <a:gradFill rotWithShape="1">
+          <a:gsLst>
+            <a:gs pos="0">
+              <a:schemeClr val="phClr">
+                <a:lumMod val="110000"/>
+                <a:satMod val="105000"/>
+                <a:tint val="67000"/>
+              </a:schemeClr>
+            </a:gs>
+            <a:gs pos="50000">
+              <a:schemeClr val="phClr">
+                <a:lumMod val="105000"/>
+                <a:satMod val="103000"/>
+                <a:tint val="73000"/>
+              </a:schemeClr>
+            </a:gs>
+            <a:gs pos="100000">
+              <a:schemeClr val="phClr">
+                <a:lumMod val="105000"/>
+                <a:satMod val="109000"/>
+                <a:tint val="81000"/>
+              </a:schemeClr>
+            </a:gs>
+          </a:gsLst>
+          <a:lin ang="5400000" scaled="0"/>
+        </a:gradFill>
+        <a:gradFill rotWithShape="1">
+          <a:gsLst>
+            <a:gs pos="0">
+              <a:schemeClr val="phClr">
+                <a:satMod val="103000"/>
+                <a:lumMod val="102000"/>
+                <a:tint val="94000"/>
+              </a:schemeClr>
+            </a:gs>
+            <a:gs pos="50000">
+              <a:schemeClr val="phClr">
+                <a:satMod val="110000"/>
+                <a:lumMod val="100000"/>
+                <a:shade val="100000"/>
+              </a:schemeClr>
+            </a:gs>
+            <a:gs pos="100000">
+              <a:schemeClr val="phClr">
+                <a:lumMod val="99000"/>
+                <a:satMod val="120000"/>
+                <a:shade val="78000"/>
+              </a:schemeClr>
+            </a:gs>
+          </a:gsLst>
+          <a:lin ang="5400000" scaled="0"/>
+        </a:gradFill>
+      </a:fillStyleLst>
+      <a:lnStyleLst>
+        <a:ln w="6350" cap="flat" cmpd="sng" algn="ctr">
+          <a:solidFill>
+            <a:schemeClr val="phClr"/>
+          </a:solidFill>
+          <a:prstDash val="solid"/>
+          <a:miter lim="800000"/>
+        </a:ln>
+        <a:ln w="12700" cap="flat" cmpd="sng" algn="ctr">
+          <a:solidFill>
+            <a:schemeClr val="phClr"/>
+          </a:solidFill>
+          <a:prstDash val="solid"/>
+          <a:miter lim="800000"/>
+        </a:ln>
+        <a:ln w="19050" cap="flat" cmpd="sng" algn="ctr">
+          <a:solidFill>
+            <a:schemeClr val="phClr"/>
+          </a:solidFill>
+          <a:prstDash val="solid"/>
+          <a:miter lim="800000"/>
+        </a:ln>
+      </a:lnStyleLst>
+      <a:effectStyleLst>
+        <a:effectStyle>
+          <a:effectLst/>
+        </a:effectStyle>
+        <a:effectStyle>
+          <a:effectLst/>
+        </a:effectStyle>
+        <a:effectStyle>
+          <a:effectLst>
+            <a:outerShdw blurRad="57150" dist="19050" dir="5400000" algn="ctr" rotWithShape="0">
+              <a:srgbClr val="000000">
+                <a:alpha val="63000"/>
+              </a:srgbClr>
+            </a:outerShdw>
+          </a:effectLst>
+        </a:effectStyle>
+      </a:effectStyleLst>
+      <a:bgFillStyleLst>
+        <a:solidFill>
+          <a:schemeClr val="phClr"/>
+        </a:solidFill>
+        <a:solidFill>
+          <a:schemeClr val="phClr">
+            <a:tint val="95000"/>
+            <a:satMod val="170000"/>
+          </a:schemeClr>
+        </a:solidFill>
+        <a:gradFill rotWithShape="1">
+          <a:gsLst>
+            <a:gs pos="0">
+              <a:schemeClr val="phClr">
+                <a:tint val="93000"/>
+                <a:satMod val="150000"/>
+                <a:shade val="98000"/>
+                <a:lumMod val="102000"/>
+              </a:schemeClr>
+            </a:gs>
+            <a:gs pos="50000">
+              <a:schemeClr val="phClr">
+                <a:tint val="98000"/>
+                <a:satMod val="130000"/>
+                <a:shade val="90000"/>
+                <a:lumMod val="103000"/>
+              </a:schemeClr>
+            </a:gs>
+            <a:gs pos="100000">
+              <a:schemeClr val="phClr">
+                <a:shade val="63000"/>
+                <a:satMod val="120000"/>
+              </a:schemeClr>
+            </a:gs>
+          </a:gsLst>
+          <a:lin ang="5400000" scaled="0"/>
+        </a:gradFill>
+      </a:bgFillStyleLst>
+    </a:fmtScheme>
+  </a:themeElements>
+  <a:objectDefaults/>
+  <a:extraClrSchemeLst/>
+  <a:extLst>
+    <a:ext uri="{05A4C25C-085E-4340-85A3-A5531E510DB2}">
+      <thm15:themeFamily xmlns:thm15="http://schemas.microsoft.com/office/thememl/2012/main" name="Office Theme" id="{62F939B6-93AF-4DB8-9C6B-D6C7DFDC589F}" vid="{4A3C46E8-61CC-4603-A589-7422A47A8E4A}"/>
+    </a:ext>
+  </a:extLst>
+</a:theme>
 </file>
</xml_diff>